<commit_message>
fixed some spelling errors
</commit_message>
<xml_diff>
--- a/DeliverableTwoPowerpoint.pptx
+++ b/DeliverableTwoPowerpoint.pptx
@@ -113,6 +113,11 @@
       </a:defRPr>
     </a:lvl9pPr>
   </p:defaultTextStyle>
+  <p:extLst>
+    <p:ext uri="{EFAFB233-063F-42B5-8137-9DF3F51BA10A}">
+      <p15:sldGuideLst xmlns:p15="http://schemas.microsoft.com/office/powerpoint/2012/main"/>
+    </p:ext>
+  </p:extLst>
 </p:presentation>
 </file>
 
@@ -249,7 +254,7 @@
           <a:p>
             <a:fld id="{928CA191-D17A-40EC-895B-B15F84D258C4}" type="datetimeFigureOut">
               <a:rPr lang="en-US" smtClean="0"/>
-              <a:t>10/26/2014</a:t>
+              <a:t>10/29/2014</a:t>
             </a:fld>
             <a:endParaRPr lang="en-US"/>
           </a:p>
@@ -536,7 +541,7 @@
           <a:p>
             <a:fld id="{928CA191-D17A-40EC-895B-B15F84D258C4}" type="datetimeFigureOut">
               <a:rPr lang="en-US" smtClean="0"/>
-              <a:t>10/26/2014</a:t>
+              <a:t>10/29/2014</a:t>
             </a:fld>
             <a:endParaRPr lang="en-US"/>
           </a:p>
@@ -728,7 +733,7 @@
           <a:p>
             <a:fld id="{928CA191-D17A-40EC-895B-B15F84D258C4}" type="datetimeFigureOut">
               <a:rPr lang="en-US" smtClean="0"/>
-              <a:t>10/26/2014</a:t>
+              <a:t>10/29/2014</a:t>
             </a:fld>
             <a:endParaRPr lang="en-US"/>
           </a:p>
@@ -989,7 +994,7 @@
           <a:p>
             <a:fld id="{928CA191-D17A-40EC-895B-B15F84D258C4}" type="datetimeFigureOut">
               <a:rPr lang="en-US" smtClean="0"/>
-              <a:t>10/26/2014</a:t>
+              <a:t>10/29/2014</a:t>
             </a:fld>
             <a:endParaRPr lang="en-US"/>
           </a:p>
@@ -1413,7 +1418,7 @@
           <a:p>
             <a:fld id="{928CA191-D17A-40EC-895B-B15F84D258C4}" type="datetimeFigureOut">
               <a:rPr lang="en-US" smtClean="0"/>
-              <a:t>10/26/2014</a:t>
+              <a:t>10/29/2014</a:t>
             </a:fld>
             <a:endParaRPr lang="en-US"/>
           </a:p>
@@ -1959,7 +1964,7 @@
           <a:p>
             <a:fld id="{928CA191-D17A-40EC-895B-B15F84D258C4}" type="datetimeFigureOut">
               <a:rPr lang="en-US" smtClean="0"/>
-              <a:t>10/26/2014</a:t>
+              <a:t>10/29/2014</a:t>
             </a:fld>
             <a:endParaRPr lang="en-US"/>
           </a:p>
@@ -2799,7 +2804,7 @@
           <a:p>
             <a:fld id="{928CA191-D17A-40EC-895B-B15F84D258C4}" type="datetimeFigureOut">
               <a:rPr lang="en-US" smtClean="0"/>
-              <a:t>10/26/2014</a:t>
+              <a:t>10/29/2014</a:t>
             </a:fld>
             <a:endParaRPr lang="en-US"/>
           </a:p>
@@ -2969,7 +2974,7 @@
           <a:p>
             <a:fld id="{928CA191-D17A-40EC-895B-B15F84D258C4}" type="datetimeFigureOut">
               <a:rPr lang="en-US" smtClean="0"/>
-              <a:t>10/26/2014</a:t>
+              <a:t>10/29/2014</a:t>
             </a:fld>
             <a:endParaRPr lang="en-US"/>
           </a:p>
@@ -3153,7 +3158,7 @@
           <a:p>
             <a:fld id="{928CA191-D17A-40EC-895B-B15F84D258C4}" type="datetimeFigureOut">
               <a:rPr lang="en-US" smtClean="0"/>
-              <a:t>10/26/2014</a:t>
+              <a:t>10/29/2014</a:t>
             </a:fld>
             <a:endParaRPr lang="en-US"/>
           </a:p>
@@ -3323,7 +3328,7 @@
           <a:p>
             <a:fld id="{928CA191-D17A-40EC-895B-B15F84D258C4}" type="datetimeFigureOut">
               <a:rPr lang="en-US" smtClean="0"/>
-              <a:t>10/26/2014</a:t>
+              <a:t>10/29/2014</a:t>
             </a:fld>
             <a:endParaRPr lang="en-US"/>
           </a:p>
@@ -3571,7 +3576,7 @@
           <a:p>
             <a:fld id="{928CA191-D17A-40EC-895B-B15F84D258C4}" type="datetimeFigureOut">
               <a:rPr lang="en-US" smtClean="0"/>
-              <a:t>10/26/2014</a:t>
+              <a:t>10/29/2014</a:t>
             </a:fld>
             <a:endParaRPr lang="en-US"/>
           </a:p>
@@ -3808,7 +3813,7 @@
           <a:p>
             <a:fld id="{928CA191-D17A-40EC-895B-B15F84D258C4}" type="datetimeFigureOut">
               <a:rPr lang="en-US" smtClean="0"/>
-              <a:t>10/26/2014</a:t>
+              <a:t>10/29/2014</a:t>
             </a:fld>
             <a:endParaRPr lang="en-US"/>
           </a:p>
@@ -4181,7 +4186,7 @@
           <a:p>
             <a:fld id="{928CA191-D17A-40EC-895B-B15F84D258C4}" type="datetimeFigureOut">
               <a:rPr lang="en-US" smtClean="0"/>
-              <a:t>10/26/2014</a:t>
+              <a:t>10/29/2014</a:t>
             </a:fld>
             <a:endParaRPr lang="en-US"/>
           </a:p>
@@ -4299,7 +4304,7 @@
           <a:p>
             <a:fld id="{928CA191-D17A-40EC-895B-B15F84D258C4}" type="datetimeFigureOut">
               <a:rPr lang="en-US" smtClean="0"/>
-              <a:t>10/26/2014</a:t>
+              <a:t>10/29/2014</a:t>
             </a:fld>
             <a:endParaRPr lang="en-US"/>
           </a:p>
@@ -4394,7 +4399,7 @@
           <a:p>
             <a:fld id="{928CA191-D17A-40EC-895B-B15F84D258C4}" type="datetimeFigureOut">
               <a:rPr lang="en-US" smtClean="0"/>
-              <a:t>10/26/2014</a:t>
+              <a:t>10/29/2014</a:t>
             </a:fld>
             <a:endParaRPr lang="en-US"/>
           </a:p>
@@ -4645,7 +4650,7 @@
           <a:p>
             <a:fld id="{928CA191-D17A-40EC-895B-B15F84D258C4}" type="datetimeFigureOut">
               <a:rPr lang="en-US" smtClean="0"/>
-              <a:t>10/26/2014</a:t>
+              <a:t>10/29/2014</a:t>
             </a:fld>
             <a:endParaRPr lang="en-US"/>
           </a:p>
@@ -4932,7 +4937,7 @@
           <a:p>
             <a:fld id="{928CA191-D17A-40EC-895B-B15F84D258C4}" type="datetimeFigureOut">
               <a:rPr lang="en-US" smtClean="0"/>
-              <a:t>10/26/2014</a:t>
+              <a:t>10/29/2014</a:t>
             </a:fld>
             <a:endParaRPr lang="en-US"/>
           </a:p>
@@ -5145,7 +5150,7 @@
           <a:p>
             <a:fld id="{928CA191-D17A-40EC-895B-B15F84D258C4}" type="datetimeFigureOut">
               <a:rPr lang="en-US" smtClean="0"/>
-              <a:t>10/26/2014</a:t>
+              <a:t>10/29/2014</a:t>
             </a:fld>
             <a:endParaRPr lang="en-US"/>
           </a:p>
@@ -5718,8 +5723,8 @@
           <a:lstStyle/>
           <a:p>
             <a:r>
-              <a:rPr lang="en-US" dirty="0" smtClean="0"/>
-              <a:t>WeeklyHistory.java </a:t>
+              <a:rPr lang="en-US" smtClean="0"/>
+              <a:t>Week.java </a:t>
             </a:r>
             <a:endParaRPr lang="en-US" dirty="0"/>
           </a:p>
@@ -5779,11 +5784,19 @@
             </a:r>
             <a:r>
               <a:rPr lang="en-US" dirty="0" err="1"/>
-              <a:t>getDay</a:t>
+              <a:t>s</a:t>
+            </a:r>
+            <a:r>
+              <a:rPr lang="en-US" dirty="0" err="1" smtClean="0"/>
+              <a:t>etDay</a:t>
+            </a:r>
+            <a:r>
+              <a:rPr lang="en-US" dirty="0" smtClean="0"/>
+              <a:t>(Date </a:t>
             </a:r>
             <a:r>
               <a:rPr lang="en-US" dirty="0"/>
-              <a:t>(Date date) </a:t>
+              <a:t>date) </a:t>
             </a:r>
             <a:endParaRPr lang="en-US" dirty="0" smtClean="0"/>
           </a:p>
@@ -6777,7 +6790,6 @@
               <a:rPr lang="en-US" dirty="0" smtClean="0"/>
               <a:t> week</a:t>
             </a:r>
-            <a:endParaRPr lang="en-US" dirty="0" smtClean="0"/>
           </a:p>
           <a:p>
             <a:r>
@@ -7263,7 +7275,6 @@
               <a:rPr lang="en-US" dirty="0" smtClean="0"/>
               <a:t>}</a:t>
             </a:r>
-            <a:endParaRPr lang="en-US" dirty="0" smtClean="0"/>
           </a:p>
           <a:p>
             <a:r>

</xml_diff>